<commit_message>
Refined .pdf and .pptx with comments
</commit_message>
<xml_diff>
--- a/assignment3/assignment3.pptx
+++ b/assignment3/assignment3.pptx
@@ -104,6 +104,11 @@
       </a:defRPr>
     </a:lvl9pPr>
   </p:defaultTextStyle>
+  <p:extLst>
+    <p:ext uri="{EFAFB233-063F-42B5-8137-9DF3F51BA10A}">
+      <p15:sldGuideLst xmlns:p15="http://schemas.microsoft.com/office/powerpoint/2012/main"/>
+    </p:ext>
+  </p:extLst>
 </p:presentation>
 </file>
 
@@ -256,7 +261,7 @@
           <a:p>
             <a:fld id="{28AED37F-E1F8-2044-AA03-B64BA0278453}" type="datetimeFigureOut">
               <a:rPr lang="de-DE" smtClean="0"/>
-              <a:t>20.11.19</a:t>
+              <a:t>24.11.19</a:t>
             </a:fld>
             <a:endParaRPr lang="de-DE"/>
           </a:p>
@@ -456,7 +461,7 @@
           <a:p>
             <a:fld id="{28AED37F-E1F8-2044-AA03-B64BA0278453}" type="datetimeFigureOut">
               <a:rPr lang="de-DE" smtClean="0"/>
-              <a:t>20.11.19</a:t>
+              <a:t>24.11.19</a:t>
             </a:fld>
             <a:endParaRPr lang="de-DE"/>
           </a:p>
@@ -666,7 +671,7 @@
           <a:p>
             <a:fld id="{28AED37F-E1F8-2044-AA03-B64BA0278453}" type="datetimeFigureOut">
               <a:rPr lang="de-DE" smtClean="0"/>
-              <a:t>20.11.19</a:t>
+              <a:t>24.11.19</a:t>
             </a:fld>
             <a:endParaRPr lang="de-DE"/>
           </a:p>
@@ -866,7 +871,7 @@
           <a:p>
             <a:fld id="{28AED37F-E1F8-2044-AA03-B64BA0278453}" type="datetimeFigureOut">
               <a:rPr lang="de-DE" smtClean="0"/>
-              <a:t>20.11.19</a:t>
+              <a:t>24.11.19</a:t>
             </a:fld>
             <a:endParaRPr lang="de-DE"/>
           </a:p>
@@ -1142,7 +1147,7 @@
           <a:p>
             <a:fld id="{28AED37F-E1F8-2044-AA03-B64BA0278453}" type="datetimeFigureOut">
               <a:rPr lang="de-DE" smtClean="0"/>
-              <a:t>20.11.19</a:t>
+              <a:t>24.11.19</a:t>
             </a:fld>
             <a:endParaRPr lang="de-DE"/>
           </a:p>
@@ -1410,7 +1415,7 @@
           <a:p>
             <a:fld id="{28AED37F-E1F8-2044-AA03-B64BA0278453}" type="datetimeFigureOut">
               <a:rPr lang="de-DE" smtClean="0"/>
-              <a:t>20.11.19</a:t>
+              <a:t>24.11.19</a:t>
             </a:fld>
             <a:endParaRPr lang="de-DE"/>
           </a:p>
@@ -1825,7 +1830,7 @@
           <a:p>
             <a:fld id="{28AED37F-E1F8-2044-AA03-B64BA0278453}" type="datetimeFigureOut">
               <a:rPr lang="de-DE" smtClean="0"/>
-              <a:t>20.11.19</a:t>
+              <a:t>24.11.19</a:t>
             </a:fld>
             <a:endParaRPr lang="de-DE"/>
           </a:p>
@@ -1967,7 +1972,7 @@
           <a:p>
             <a:fld id="{28AED37F-E1F8-2044-AA03-B64BA0278453}" type="datetimeFigureOut">
               <a:rPr lang="de-DE" smtClean="0"/>
-              <a:t>20.11.19</a:t>
+              <a:t>24.11.19</a:t>
             </a:fld>
             <a:endParaRPr lang="de-DE"/>
           </a:p>
@@ -2080,7 +2085,7 @@
           <a:p>
             <a:fld id="{28AED37F-E1F8-2044-AA03-B64BA0278453}" type="datetimeFigureOut">
               <a:rPr lang="de-DE" smtClean="0"/>
-              <a:t>20.11.19</a:t>
+              <a:t>24.11.19</a:t>
             </a:fld>
             <a:endParaRPr lang="de-DE"/>
           </a:p>
@@ -2393,7 +2398,7 @@
           <a:p>
             <a:fld id="{28AED37F-E1F8-2044-AA03-B64BA0278453}" type="datetimeFigureOut">
               <a:rPr lang="de-DE" smtClean="0"/>
-              <a:t>20.11.19</a:t>
+              <a:t>24.11.19</a:t>
             </a:fld>
             <a:endParaRPr lang="de-DE"/>
           </a:p>
@@ -2682,7 +2687,7 @@
           <a:p>
             <a:fld id="{28AED37F-E1F8-2044-AA03-B64BA0278453}" type="datetimeFigureOut">
               <a:rPr lang="de-DE" smtClean="0"/>
-              <a:t>20.11.19</a:t>
+              <a:t>24.11.19</a:t>
             </a:fld>
             <a:endParaRPr lang="de-DE"/>
           </a:p>
@@ -2925,7 +2930,7 @@
           <a:p>
             <a:fld id="{28AED37F-E1F8-2044-AA03-B64BA0278453}" type="datetimeFigureOut">
               <a:rPr lang="de-DE" smtClean="0"/>
-              <a:t>20.11.19</a:t>
+              <a:t>24.11.19</a:t>
             </a:fld>
             <a:endParaRPr lang="de-DE"/>
           </a:p>
@@ -3344,10 +3349,10 @@
       </p:grpSpPr>
       <p:pic>
         <p:nvPicPr>
-          <p:cNvPr id="6" name="Picture 5">
-            <a:extLst>
-              <a:ext uri="{FF2B5EF4-FFF2-40B4-BE49-F238E27FC236}">
-                <a16:creationId xmlns:a16="http://schemas.microsoft.com/office/drawing/2014/main" id="{869594E8-9AF5-4243-BA5D-EF6743DC44C1}"/>
+          <p:cNvPr id="2" name="Picture 1">
+            <a:extLst>
+              <a:ext uri="{FF2B5EF4-FFF2-40B4-BE49-F238E27FC236}">
+                <a16:creationId xmlns:a16="http://schemas.microsoft.com/office/drawing/2014/main" id="{C2CBB6C7-1226-664D-87D5-A3C823DF9B32}"/>
               </a:ext>
             </a:extLst>
           </p:cNvPr>
@@ -3364,8 +3369,8 @@
         </p:blipFill>
         <p:spPr>
           <a:xfrm>
-            <a:off x="6231693" y="1479318"/>
-            <a:ext cx="5708058" cy="3510030"/>
+            <a:off x="237868" y="1629000"/>
+            <a:ext cx="5745600" cy="3600000"/>
           </a:xfrm>
           <a:prstGeom prst="rect">
             <a:avLst/>
@@ -3374,10 +3379,10 @@
       </p:pic>
       <p:pic>
         <p:nvPicPr>
-          <p:cNvPr id="5" name="Picture 4">
-            <a:extLst>
-              <a:ext uri="{FF2B5EF4-FFF2-40B4-BE49-F238E27FC236}">
-                <a16:creationId xmlns:a16="http://schemas.microsoft.com/office/drawing/2014/main" id="{F09F4CF9-BA0F-C340-B901-9A54AE381EAD}"/>
+          <p:cNvPr id="3" name="Picture 2">
+            <a:extLst>
+              <a:ext uri="{FF2B5EF4-FFF2-40B4-BE49-F238E27FC236}">
+                <a16:creationId xmlns:a16="http://schemas.microsoft.com/office/drawing/2014/main" id="{845CEE73-D218-514E-9C7D-C500F10F1313}"/>
               </a:ext>
             </a:extLst>
           </p:cNvPr>
@@ -3394,8 +3399,8 @@
         </p:blipFill>
         <p:spPr>
           <a:xfrm>
-            <a:off x="252249" y="1479318"/>
-            <a:ext cx="5792141" cy="3557783"/>
+            <a:off x="6302565" y="1629000"/>
+            <a:ext cx="5783133" cy="3600000"/>
           </a:xfrm>
           <a:prstGeom prst="rect">
             <a:avLst/>

</xml_diff>